<commit_message>
updates on figure 1
</commit_message>
<xml_diff>
--- a/Data/sgRNA/Figure1/figure1.pptx
+++ b/Data/sgRNA/Figure1/figure1.pptx
@@ -7,9 +7,11 @@
   <p:sldIdLst>
     <p:sldId id="256" r:id="rId3"/>
     <p:sldId id="258" r:id="rId4"/>
-    <p:sldId id="257" r:id="rId5"/>
-    <p:sldId id="259" r:id="rId6"/>
-    <p:sldId id="260" r:id="rId7"/>
+    <p:sldId id="262" r:id="rId5"/>
+    <p:sldId id="257" r:id="rId6"/>
+    <p:sldId id="259" r:id="rId7"/>
+    <p:sldId id="260" r:id="rId8"/>
+    <p:sldId id="264" r:id="rId9"/>
   </p:sldIdLst>
   <p:sldSz cx="12192000" cy="6858000"/>
   <p:notesSz cx="6858000" cy="9144000"/>
@@ -3870,6 +3872,156 @@
       <p:grpSpPr/>
       <p:pic>
         <p:nvPicPr>
+          <p:cNvPr id="4" name="Picture 3" descr="Screenshot 2025-02-03 at 11.21.34 AM"/>
+          <p:cNvPicPr>
+            <a:picLocks noChangeAspect="1"/>
+          </p:cNvPicPr>
+          <p:nvPr/>
+        </p:nvPicPr>
+        <p:blipFill>
+          <a:blip r:embed="rId1"/>
+          <a:stretch>
+            <a:fillRect/>
+          </a:stretch>
+        </p:blipFill>
+        <p:spPr>
+          <a:xfrm>
+            <a:off x="2543175" y="1668145"/>
+            <a:ext cx="4439920" cy="3275330"/>
+          </a:xfrm>
+          <a:prstGeom prst="rect">
+            <a:avLst/>
+          </a:prstGeom>
+        </p:spPr>
+      </p:pic>
+      <p:cxnSp>
+        <p:nvCxnSpPr>
+          <p:cNvPr id="11" name="Straight Connector 10"/>
+          <p:cNvCxnSpPr/>
+          <p:nvPr/>
+        </p:nvCxnSpPr>
+        <p:spPr>
+          <a:xfrm>
+            <a:off x="2691130" y="4378960"/>
+            <a:ext cx="4291965" cy="0"/>
+          </a:xfrm>
+          <a:prstGeom prst="line">
+            <a:avLst/>
+          </a:prstGeom>
+          <a:ln w="41275" cmpd="sng">
+            <a:solidFill>
+              <a:srgbClr val="FF0000"/>
+            </a:solidFill>
+            <a:prstDash val="solid"/>
+          </a:ln>
+        </p:spPr>
+        <p:style>
+          <a:lnRef idx="2">
+            <a:schemeClr val="accent1"/>
+          </a:lnRef>
+          <a:fillRef idx="0">
+            <a:srgbClr val="FFFFFF"/>
+          </a:fillRef>
+          <a:effectRef idx="0">
+            <a:srgbClr val="FFFFFF"/>
+          </a:effectRef>
+          <a:fontRef idx="minor">
+            <a:schemeClr val="tx1"/>
+          </a:fontRef>
+        </p:style>
+      </p:cxnSp>
+      <p:sp>
+        <p:nvSpPr>
+          <p:cNvPr id="13" name="Text Box 12"/>
+          <p:cNvSpPr txBox="1"/>
+          <p:nvPr/>
+        </p:nvSpPr>
+        <p:spPr>
+          <a:xfrm>
+            <a:off x="2853690" y="1590040"/>
+            <a:ext cx="4064000" cy="460375"/>
+          </a:xfrm>
+          <a:prstGeom prst="rect">
+            <a:avLst/>
+          </a:prstGeom>
+          <a:noFill/>
+        </p:spPr>
+        <p:txBody>
+          <a:bodyPr wrap="square" rtlCol="0">
+            <a:spAutoFit/>
+          </a:bodyPr>
+          <a:p>
+            <a:r>
+              <a:rPr lang="en-US" sz="1200"/>
+              <a:t>Dots: different RNAs</a:t>
+            </a:r>
+            <a:endParaRPr lang="en-US" sz="1200"/>
+          </a:p>
+          <a:p>
+            <a:r>
+              <a:rPr lang="en-US" sz="1200"/>
+              <a:t>       : ~10% of the most abundant RNA intensity</a:t>
+            </a:r>
+            <a:endParaRPr lang="en-US" sz="1200"/>
+          </a:p>
+        </p:txBody>
+      </p:sp>
+      <p:cxnSp>
+        <p:nvCxnSpPr>
+          <p:cNvPr id="5" name="Straight Connector 4"/>
+          <p:cNvCxnSpPr/>
+          <p:nvPr/>
+        </p:nvCxnSpPr>
+        <p:spPr>
+          <a:xfrm>
+            <a:off x="2919095" y="1917700"/>
+            <a:ext cx="276860" cy="0"/>
+          </a:xfrm>
+          <a:prstGeom prst="line">
+            <a:avLst/>
+          </a:prstGeom>
+          <a:ln w="41275" cmpd="sng">
+            <a:solidFill>
+              <a:srgbClr val="FF0000"/>
+            </a:solidFill>
+            <a:prstDash val="solid"/>
+          </a:ln>
+        </p:spPr>
+        <p:style>
+          <a:lnRef idx="2">
+            <a:schemeClr val="accent1"/>
+          </a:lnRef>
+          <a:fillRef idx="0">
+            <a:srgbClr val="FFFFFF"/>
+          </a:fillRef>
+          <a:effectRef idx="0">
+            <a:srgbClr val="FFFFFF"/>
+          </a:effectRef>
+          <a:fontRef idx="minor">
+            <a:schemeClr val="tx1"/>
+          </a:fontRef>
+        </p:style>
+      </p:cxnSp>
+    </p:spTree>
+  </p:cSld>
+  <p:clrMapOvr>
+    <a:masterClrMapping/>
+  </p:clrMapOvr>
+</p:sld>
+</file>
+
+<file path=ppt/slides/slide4.xml><?xml version="1.0" encoding="utf-8"?>
+<p:sld xmlns:a="http://schemas.openxmlformats.org/drawingml/2006/main" xmlns:r="http://schemas.openxmlformats.org/officeDocument/2006/relationships" xmlns:p="http://schemas.openxmlformats.org/presentationml/2006/main">
+  <p:cSld>
+    <p:spTree>
+      <p:nvGrpSpPr>
+        <p:cNvPr id="1" name=""/>
+        <p:cNvGrpSpPr/>
+        <p:nvPr/>
+      </p:nvGrpSpPr>
+      <p:grpSpPr/>
+      <p:pic>
+        <p:nvPicPr>
           <p:cNvPr id="48" name="Picture 47" descr="Screenshot 2025-01-26 at 12.00.45 PM"/>
           <p:cNvPicPr>
             <a:picLocks noChangeAspect="1"/>
@@ -4965,7 +5117,7 @@
 </p:sld>
 </file>
 
-<file path=ppt/slides/slide4.xml><?xml version="1.0" encoding="utf-8"?>
+<file path=ppt/slides/slide5.xml><?xml version="1.0" encoding="utf-8"?>
 <p:sld xmlns:a="http://schemas.openxmlformats.org/drawingml/2006/main" xmlns:r="http://schemas.openxmlformats.org/officeDocument/2006/relationships" xmlns:p="http://schemas.openxmlformats.org/presentationml/2006/main">
   <p:cSld>
     <p:spTree>
@@ -5151,7 +5303,7 @@
 </p:sld>
 </file>
 
-<file path=ppt/slides/slide5.xml><?xml version="1.0" encoding="utf-8"?>
+<file path=ppt/slides/slide6.xml><?xml version="1.0" encoding="utf-8"?>
 <p:sld xmlns:a="http://schemas.openxmlformats.org/drawingml/2006/main" xmlns:r="http://schemas.openxmlformats.org/officeDocument/2006/relationships" xmlns:p="http://schemas.openxmlformats.org/presentationml/2006/main">
   <p:cSld>
     <p:spTree>
@@ -6394,6 +6546,192 @@
           </a:fontRef>
         </p:style>
       </p:cxnSp>
+    </p:spTree>
+  </p:cSld>
+  <p:clrMapOvr>
+    <a:masterClrMapping/>
+  </p:clrMapOvr>
+</p:sld>
+</file>
+
+<file path=ppt/slides/slide7.xml><?xml version="1.0" encoding="utf-8"?>
+<p:sld xmlns:a="http://schemas.openxmlformats.org/drawingml/2006/main" xmlns:r="http://schemas.openxmlformats.org/officeDocument/2006/relationships" xmlns:p="http://schemas.openxmlformats.org/presentationml/2006/main">
+  <p:cSld>
+    <p:spTree>
+      <p:nvGrpSpPr>
+        <p:cNvPr id="1" name=""/>
+        <p:cNvGrpSpPr/>
+        <p:nvPr/>
+      </p:nvGrpSpPr>
+      <p:grpSpPr/>
+      <p:pic>
+        <p:nvPicPr>
+          <p:cNvPr id="34" name="Picture 33" descr="Screenshot 2025-01-26 at 12.14.00 PM"/>
+          <p:cNvPicPr>
+            <a:picLocks noChangeAspect="1"/>
+          </p:cNvPicPr>
+          <p:nvPr/>
+        </p:nvPicPr>
+        <p:blipFill>
+          <a:blip r:embed="rId1"/>
+          <a:stretch>
+            <a:fillRect/>
+          </a:stretch>
+        </p:blipFill>
+        <p:spPr>
+          <a:xfrm>
+            <a:off x="6690360" y="433705"/>
+            <a:ext cx="3562985" cy="2473325"/>
+          </a:xfrm>
+          <a:prstGeom prst="rect">
+            <a:avLst/>
+          </a:prstGeom>
+        </p:spPr>
+      </p:pic>
+      <p:pic>
+        <p:nvPicPr>
+          <p:cNvPr id="5" name="Picture 4" descr="Screenshot 2025-01-26 at 12.05.38 PM"/>
+          <p:cNvPicPr>
+            <a:picLocks noChangeAspect="1"/>
+          </p:cNvPicPr>
+          <p:nvPr/>
+        </p:nvPicPr>
+        <p:blipFill>
+          <a:blip r:embed="rId2"/>
+          <a:stretch>
+            <a:fillRect/>
+          </a:stretch>
+        </p:blipFill>
+        <p:spPr>
+          <a:xfrm>
+            <a:off x="6631305" y="3513455"/>
+            <a:ext cx="3597910" cy="2473325"/>
+          </a:xfrm>
+          <a:prstGeom prst="rect">
+            <a:avLst/>
+          </a:prstGeom>
+        </p:spPr>
+      </p:pic>
+      <p:cxnSp>
+        <p:nvCxnSpPr>
+          <p:cNvPr id="44" name="Straight Connector 43"/>
+          <p:cNvCxnSpPr/>
+          <p:nvPr/>
+        </p:nvCxnSpPr>
+        <p:spPr>
+          <a:xfrm>
+            <a:off x="6690360" y="2265680"/>
+            <a:ext cx="3527425" cy="0"/>
+          </a:xfrm>
+          <a:prstGeom prst="line">
+            <a:avLst/>
+          </a:prstGeom>
+          <a:ln w="28575" cmpd="sng">
+            <a:solidFill>
+              <a:srgbClr val="FF0000"/>
+            </a:solidFill>
+            <a:prstDash val="solid"/>
+          </a:ln>
+        </p:spPr>
+        <p:style>
+          <a:lnRef idx="2">
+            <a:schemeClr val="accent1"/>
+          </a:lnRef>
+          <a:fillRef idx="0">
+            <a:srgbClr val="FFFFFF"/>
+          </a:fillRef>
+          <a:effectRef idx="0">
+            <a:srgbClr val="FFFFFF"/>
+          </a:effectRef>
+          <a:fontRef idx="minor">
+            <a:schemeClr val="tx1"/>
+          </a:fontRef>
+        </p:style>
+      </p:cxnSp>
+      <p:cxnSp>
+        <p:nvCxnSpPr>
+          <p:cNvPr id="6" name="Straight Connector 5"/>
+          <p:cNvCxnSpPr/>
+          <p:nvPr/>
+        </p:nvCxnSpPr>
+        <p:spPr>
+          <a:xfrm>
+            <a:off x="6701790" y="5332095"/>
+            <a:ext cx="3527425" cy="0"/>
+          </a:xfrm>
+          <a:prstGeom prst="line">
+            <a:avLst/>
+          </a:prstGeom>
+          <a:ln w="28575" cmpd="sng">
+            <a:solidFill>
+              <a:srgbClr val="FF0000"/>
+            </a:solidFill>
+            <a:prstDash val="solid"/>
+          </a:ln>
+        </p:spPr>
+        <p:style>
+          <a:lnRef idx="2">
+            <a:schemeClr val="accent1"/>
+          </a:lnRef>
+          <a:fillRef idx="0">
+            <a:srgbClr val="FFFFFF"/>
+          </a:fillRef>
+          <a:effectRef idx="0">
+            <a:srgbClr val="FFFFFF"/>
+          </a:effectRef>
+          <a:fontRef idx="minor">
+            <a:schemeClr val="tx1"/>
+          </a:fontRef>
+        </p:style>
+      </p:cxnSp>
+      <p:pic>
+        <p:nvPicPr>
+          <p:cNvPr id="2" name="Picture 1" descr="Screenshot 2025-02-03 at 11.53.03 AM"/>
+          <p:cNvPicPr>
+            <a:picLocks noChangeAspect="1"/>
+          </p:cNvPicPr>
+          <p:nvPr/>
+        </p:nvPicPr>
+        <p:blipFill>
+          <a:blip r:embed="rId3"/>
+          <a:stretch>
+            <a:fillRect/>
+          </a:stretch>
+        </p:blipFill>
+        <p:spPr>
+          <a:xfrm>
+            <a:off x="1673860" y="523875"/>
+            <a:ext cx="3522980" cy="2383155"/>
+          </a:xfrm>
+          <a:prstGeom prst="rect">
+            <a:avLst/>
+          </a:prstGeom>
+        </p:spPr>
+      </p:pic>
+      <p:pic>
+        <p:nvPicPr>
+          <p:cNvPr id="3" name="Picture 2" descr="Screenshot 2025-02-03 at 11.57.00 AM"/>
+          <p:cNvPicPr>
+            <a:picLocks noChangeAspect="1"/>
+          </p:cNvPicPr>
+          <p:nvPr/>
+        </p:nvPicPr>
+        <p:blipFill>
+          <a:blip r:embed="rId4"/>
+          <a:stretch>
+            <a:fillRect/>
+          </a:stretch>
+        </p:blipFill>
+        <p:spPr>
+          <a:xfrm>
+            <a:off x="1673860" y="3513455"/>
+            <a:ext cx="3591560" cy="2473325"/>
+          </a:xfrm>
+          <a:prstGeom prst="rect">
+            <a:avLst/>
+          </a:prstGeom>
+        </p:spPr>
+      </p:pic>
     </p:spTree>
   </p:cSld>
   <p:clrMapOvr>

</xml_diff>